<commit_message>
added git clone link
</commit_message>
<xml_diff>
--- a/00_Setup/Madagascar-STARTUP-2020.pptx
+++ b/00_Setup/Madagascar-STARTUP-2020.pptx
@@ -6,7 +6,7 @@
     <p:sldMasterId id="2147483661" r:id="rId2"/>
   </p:sldMasterIdLst>
   <p:notesMasterIdLst>
-    <p:notesMasterId r:id="rId10"/>
+    <p:notesMasterId r:id="rId11"/>
   </p:notesMasterIdLst>
   <p:sldIdLst>
     <p:sldId id="256" r:id="rId3"/>
@@ -15,7 +15,8 @@
     <p:sldId id="261" r:id="rId6"/>
     <p:sldId id="262" r:id="rId7"/>
     <p:sldId id="263" r:id="rId8"/>
-    <p:sldId id="259" r:id="rId9"/>
+    <p:sldId id="264" r:id="rId9"/>
+    <p:sldId id="259" r:id="rId10"/>
   </p:sldIdLst>
   <p:sldSz cx="9144000" cy="6858000" type="screen4x3"/>
   <p:notesSz cx="7772400" cy="10058400"/>
@@ -969,6 +970,90 @@
             <a:fld id="{0005BF28-9F40-8B45-B2E1-42731E16AD2F}" type="slidenum">
               <a:rPr lang="en-US" smtClean="0"/>
               <a:t>7</a:t>
+            </a:fld>
+            <a:endParaRPr lang="en-US"/>
+          </a:p>
+        </p:txBody>
+      </p:sp>
+    </p:spTree>
+    <p:extLst>
+      <p:ext uri="{BB962C8B-B14F-4D97-AF65-F5344CB8AC3E}">
+        <p14:creationId xmlns:p14="http://schemas.microsoft.com/office/powerpoint/2010/main" val="2439361650"/>
+      </p:ext>
+    </p:extLst>
+  </p:cSld>
+  <p:clrMapOvr>
+    <a:masterClrMapping/>
+  </p:clrMapOvr>
+</p:notes>
+</file>
+
+<file path=ppt/notesSlides/notesSlide7.xml><?xml version="1.0" encoding="utf-8"?>
+<p:notes xmlns:a="http://schemas.openxmlformats.org/drawingml/2006/main" xmlns:r="http://schemas.openxmlformats.org/officeDocument/2006/relationships" xmlns:p="http://schemas.openxmlformats.org/presentationml/2006/main">
+  <p:cSld>
+    <p:spTree>
+      <p:nvGrpSpPr>
+        <p:cNvPr id="1" name=""/>
+        <p:cNvGrpSpPr/>
+        <p:nvPr/>
+      </p:nvGrpSpPr>
+      <p:grpSpPr>
+        <a:xfrm>
+          <a:off x="0" y="0"/>
+          <a:ext cx="0" cy="0"/>
+          <a:chOff x="0" y="0"/>
+          <a:chExt cx="0" cy="0"/>
+        </a:xfrm>
+      </p:grpSpPr>
+      <p:sp>
+        <p:nvSpPr>
+          <p:cNvPr id="2" name="Slide Image Placeholder 1"/>
+          <p:cNvSpPr>
+            <a:spLocks noGrp="1" noRot="1" noChangeAspect="1"/>
+          </p:cNvSpPr>
+          <p:nvPr>
+            <p:ph type="sldImg"/>
+          </p:nvPr>
+        </p:nvSpPr>
+        <p:spPr/>
+      </p:sp>
+      <p:sp>
+        <p:nvSpPr>
+          <p:cNvPr id="3" name="Notes Placeholder 2"/>
+          <p:cNvSpPr>
+            <a:spLocks noGrp="1"/>
+          </p:cNvSpPr>
+          <p:nvPr>
+            <p:ph type="body" idx="1"/>
+          </p:nvPr>
+        </p:nvSpPr>
+        <p:spPr/>
+        <p:txBody>
+          <a:bodyPr/>
+          <a:lstStyle/>
+          <a:p>
+            <a:endParaRPr lang="en-US"/>
+          </a:p>
+        </p:txBody>
+      </p:sp>
+      <p:sp>
+        <p:nvSpPr>
+          <p:cNvPr id="4" name="Slide Number Placeholder 3"/>
+          <p:cNvSpPr>
+            <a:spLocks noGrp="1"/>
+          </p:cNvSpPr>
+          <p:nvPr>
+            <p:ph type="sldNum" sz="quarter" idx="5"/>
+          </p:nvPr>
+        </p:nvSpPr>
+        <p:spPr/>
+        <p:txBody>
+          <a:bodyPr/>
+          <a:lstStyle/>
+          <a:p>
+            <a:fld id="{0005BF28-9F40-8B45-B2E1-42731E16AD2F}" type="slidenum">
+              <a:rPr lang="en-US" smtClean="0"/>
+              <a:t>8</a:t>
             </a:fld>
             <a:endParaRPr lang="en-US"/>
           </a:p>
@@ -7900,6 +7985,328 @@
 </file>
 
 <file path=ppt/slides/slide7.xml><?xml version="1.0" encoding="utf-8"?>
+<p:sld xmlns:a="http://schemas.openxmlformats.org/drawingml/2006/main" xmlns:r="http://schemas.openxmlformats.org/officeDocument/2006/relationships" xmlns:p="http://schemas.openxmlformats.org/presentationml/2006/main">
+  <p:cSld>
+    <p:spTree>
+      <p:nvGrpSpPr>
+        <p:cNvPr id="1" name=""/>
+        <p:cNvGrpSpPr/>
+        <p:nvPr/>
+      </p:nvGrpSpPr>
+      <p:grpSpPr>
+        <a:xfrm>
+          <a:off x="0" y="0"/>
+          <a:ext cx="0" cy="0"/>
+          <a:chOff x="0" y="0"/>
+          <a:chExt cx="0" cy="0"/>
+        </a:xfrm>
+      </p:grpSpPr>
+      <p:sp>
+        <p:nvSpPr>
+          <p:cNvPr id="162" name="CustomShape 1"/>
+          <p:cNvSpPr/>
+          <p:nvPr/>
+        </p:nvSpPr>
+        <p:spPr>
+          <a:xfrm>
+            <a:off x="0" y="0"/>
+            <a:ext cx="9142920" cy="785880"/>
+          </a:xfrm>
+          <a:prstGeom prst="rect">
+            <a:avLst/>
+          </a:prstGeom>
+          <a:noFill/>
+          <a:ln>
+            <a:noFill/>
+          </a:ln>
+        </p:spPr>
+        <p:style>
+          <a:lnRef idx="0">
+            <a:scrgbClr r="0" g="0" b="0"/>
+          </a:lnRef>
+          <a:fillRef idx="0">
+            <a:scrgbClr r="0" g="0" b="0"/>
+          </a:fillRef>
+          <a:effectRef idx="0">
+            <a:scrgbClr r="0" g="0" b="0"/>
+          </a:effectRef>
+          <a:fontRef idx="minor"/>
+        </p:style>
+        <p:txBody>
+          <a:bodyPr lIns="90000" tIns="45000" rIns="90000" bIns="45000" anchor="ctr">
+            <a:normAutofit/>
+          </a:bodyPr>
+          <a:lstStyle/>
+          <a:p>
+            <a:pPr algn="ctr">
+              <a:lnSpc>
+                <a:spcPct val="100000"/>
+              </a:lnSpc>
+            </a:pPr>
+            <a:r>
+              <a:rPr lang="en-US" sz="3600" b="1" spc="-1" dirty="0">
+                <a:solidFill>
+                  <a:srgbClr val="964305"/>
+                </a:solidFill>
+                <a:latin typeface="Verdana"/>
+                <a:ea typeface="DejaVu Sans"/>
+              </a:rPr>
+              <a:t>M8R Workshop Materials</a:t>
+            </a:r>
+            <a:endParaRPr lang="en-US" sz="3600" b="0" strike="noStrike" spc="-1" dirty="0">
+              <a:latin typeface="Arial"/>
+            </a:endParaRPr>
+          </a:p>
+        </p:txBody>
+      </p:sp>
+      <p:sp>
+        <p:nvSpPr>
+          <p:cNvPr id="163" name="CustomShape 2"/>
+          <p:cNvSpPr/>
+          <p:nvPr/>
+        </p:nvSpPr>
+        <p:spPr>
+          <a:xfrm>
+            <a:off x="0" y="730845"/>
+            <a:ext cx="9144000" cy="6127155"/>
+          </a:xfrm>
+          <a:prstGeom prst="rect">
+            <a:avLst/>
+          </a:prstGeom>
+          <a:noFill/>
+          <a:ln>
+            <a:noFill/>
+          </a:ln>
+        </p:spPr>
+        <p:style>
+          <a:lnRef idx="0">
+            <a:scrgbClr r="0" g="0" b="0"/>
+          </a:lnRef>
+          <a:fillRef idx="0">
+            <a:scrgbClr r="0" g="0" b="0"/>
+          </a:fillRef>
+          <a:effectRef idx="0">
+            <a:scrgbClr r="0" g="0" b="0"/>
+          </a:effectRef>
+          <a:fontRef idx="minor"/>
+        </p:style>
+        <p:txBody>
+          <a:bodyPr lIns="90000" tIns="45000" rIns="90000" bIns="45000"/>
+          <a:lstStyle/>
+          <a:p>
+            <a:pPr marL="285840" indent="-284760">
+              <a:lnSpc>
+                <a:spcPct val="100000"/>
+              </a:lnSpc>
+              <a:buClr>
+                <a:srgbClr val="000000"/>
+              </a:buClr>
+              <a:buFont typeface="Arial"/>
+              <a:buChar char="•"/>
+            </a:pPr>
+            <a:r>
+              <a:rPr lang="en-US" sz="2000" spc="-1" dirty="0">
+                <a:solidFill>
+                  <a:srgbClr val="000000"/>
+                </a:solidFill>
+                <a:latin typeface="Arial"/>
+              </a:rPr>
+              <a:t>You can clone into the 2020 CSM GEOP Madagascar workshop materials from </a:t>
+            </a:r>
+            <a:r>
+              <a:rPr lang="en-US" sz="2000" spc="-1" dirty="0" err="1">
+                <a:solidFill>
+                  <a:srgbClr val="000000"/>
+                </a:solidFill>
+                <a:latin typeface="Arial"/>
+              </a:rPr>
+              <a:t>Github</a:t>
+            </a:r>
+            <a:r>
+              <a:rPr lang="en-US" sz="2000" spc="-1" dirty="0">
+                <a:solidFill>
+                  <a:srgbClr val="000000"/>
+                </a:solidFill>
+                <a:latin typeface="Arial"/>
+              </a:rPr>
+              <a:t> using the </a:t>
+            </a:r>
+            <a:r>
+              <a:rPr lang="en-US" sz="2000" spc="-1">
+                <a:solidFill>
+                  <a:srgbClr val="000000"/>
+                </a:solidFill>
+                <a:latin typeface="Arial"/>
+              </a:rPr>
+              <a:t>following command:</a:t>
+            </a:r>
+            <a:endParaRPr lang="en-US" sz="2000" spc="-1" dirty="0">
+              <a:solidFill>
+                <a:srgbClr val="000000"/>
+              </a:solidFill>
+              <a:latin typeface="Arial"/>
+            </a:endParaRPr>
+          </a:p>
+          <a:p>
+            <a:pPr marL="285840" indent="-284760">
+              <a:lnSpc>
+                <a:spcPct val="100000"/>
+              </a:lnSpc>
+              <a:buClr>
+                <a:srgbClr val="000000"/>
+              </a:buClr>
+              <a:buFont typeface="Arial"/>
+              <a:buChar char="•"/>
+            </a:pPr>
+            <a:endParaRPr lang="en-US" sz="2000" spc="-1" dirty="0">
+              <a:solidFill>
+                <a:srgbClr val="000000"/>
+              </a:solidFill>
+              <a:latin typeface="Arial"/>
+            </a:endParaRPr>
+          </a:p>
+          <a:p>
+            <a:pPr marL="743040" lvl="1" indent="-284760">
+              <a:buClr>
+                <a:srgbClr val="000000"/>
+              </a:buClr>
+              <a:buFont typeface="Arial"/>
+              <a:buChar char="•"/>
+            </a:pPr>
+            <a:r>
+              <a:rPr lang="en-US" sz="2000" spc="-1" dirty="0">
+                <a:solidFill>
+                  <a:srgbClr val="000000"/>
+                </a:solidFill>
+                <a:latin typeface="Arial"/>
+              </a:rPr>
+              <a:t>g</a:t>
+            </a:r>
+            <a:r>
+              <a:rPr lang="en-US" sz="2000" spc="-1" dirty="0">
+                <a:solidFill>
+                  <a:srgbClr val="000000"/>
+                </a:solidFill>
+              </a:rPr>
+              <a:t>it clone https://</a:t>
+            </a:r>
+            <a:r>
+              <a:rPr lang="en-US" sz="2000" spc="-1" dirty="0" err="1">
+                <a:solidFill>
+                  <a:srgbClr val="000000"/>
+                </a:solidFill>
+              </a:rPr>
+              <a:t>github.com</a:t>
+            </a:r>
+            <a:r>
+              <a:rPr lang="en-US" sz="2000" spc="-1" dirty="0">
+                <a:solidFill>
+                  <a:srgbClr val="000000"/>
+                </a:solidFill>
+              </a:rPr>
+              <a:t>/</a:t>
+            </a:r>
+            <a:r>
+              <a:rPr lang="en-US" sz="2000" spc="-1" dirty="0" err="1">
+                <a:solidFill>
+                  <a:srgbClr val="000000"/>
+                </a:solidFill>
+              </a:rPr>
+              <a:t>jshragge</a:t>
+            </a:r>
+            <a:r>
+              <a:rPr lang="en-US" sz="2000" spc="-1" dirty="0">
+                <a:solidFill>
+                  <a:srgbClr val="000000"/>
+                </a:solidFill>
+              </a:rPr>
+              <a:t>/CSM_GEOP_M8R.git </a:t>
+            </a:r>
+          </a:p>
+          <a:p>
+            <a:pPr marL="743040" lvl="1" indent="-284760">
+              <a:buClr>
+                <a:srgbClr val="000000"/>
+              </a:buClr>
+              <a:buFont typeface="Arial"/>
+              <a:buChar char="•"/>
+            </a:pPr>
+            <a:endParaRPr lang="en-US" sz="2000" spc="-1" dirty="0">
+              <a:solidFill>
+                <a:srgbClr val="000000"/>
+              </a:solidFill>
+            </a:endParaRPr>
+          </a:p>
+          <a:p>
+            <a:pPr marL="285840" indent="-284760">
+              <a:buClr>
+                <a:srgbClr val="000000"/>
+              </a:buClr>
+              <a:buFont typeface="Arial"/>
+              <a:buChar char="•"/>
+            </a:pPr>
+            <a:r>
+              <a:rPr lang="en-US" sz="2000" spc="-1" dirty="0">
+                <a:solidFill>
+                  <a:srgbClr val="000000"/>
+                </a:solidFill>
+              </a:rPr>
+              <a:t>Your local machine may not have git installed (Windows), but you should be able to do it in your home directory on Mio</a:t>
+            </a:r>
+          </a:p>
+          <a:p>
+            <a:pPr marL="285840" indent="-284760">
+              <a:buClr>
+                <a:srgbClr val="000000"/>
+              </a:buClr>
+              <a:buFont typeface="Arial"/>
+              <a:buChar char="•"/>
+            </a:pPr>
+            <a:endParaRPr lang="en-AU" sz="1600" dirty="0"/>
+          </a:p>
+        </p:txBody>
+      </p:sp>
+    </p:spTree>
+    <p:extLst>
+      <p:ext uri="{BB962C8B-B14F-4D97-AF65-F5344CB8AC3E}">
+        <p14:creationId xmlns:p14="http://schemas.microsoft.com/office/powerpoint/2010/main" val="1462542232"/>
+      </p:ext>
+    </p:extLst>
+  </p:cSld>
+  <p:clrMapOvr>
+    <a:masterClrMapping/>
+  </p:clrMapOvr>
+  <p:timing>
+    <p:tnLst>
+      <p:par>
+        <p:cTn id="1" dur="indefinite" restart="never" nodeType="tmRoot">
+          <p:childTnLst>
+            <p:seq>
+              <p:cTn id="2" dur="indefinite" nodeType="mainSeq"/>
+              <p:prevCondLst>
+                <p:cond evt="onPrev" delay="0">
+                  <p:tgtEl>
+                    <p:sldTgt/>
+                  </p:tgtEl>
+                </p:cond>
+              </p:prevCondLst>
+              <p:nextCondLst>
+                <p:cond evt="onNext" delay="0">
+                  <p:tgtEl>
+                    <p:sldTgt/>
+                  </p:tgtEl>
+                </p:cond>
+              </p:nextCondLst>
+            </p:seq>
+          </p:childTnLst>
+        </p:cTn>
+      </p:par>
+    </p:tnLst>
+  </p:timing>
+</p:sld>
+</file>
+
+<file path=ppt/slides/slide8.xml><?xml version="1.0" encoding="utf-8"?>
 <p:sld xmlns:a="http://schemas.openxmlformats.org/drawingml/2006/main" xmlns:r="http://schemas.openxmlformats.org/officeDocument/2006/relationships" xmlns:p="http://schemas.openxmlformats.org/presentationml/2006/main">
   <p:cSld>
     <p:spTree>

</xml_diff>